<commit_message>
Removed animations in code samples slides
</commit_message>
<xml_diff>
--- a/08. Web-Based App Development/8. Web-based app development En.pptx
+++ b/08. Web-Based App Development/8. Web-based app development En.pptx
@@ -1078,7 +1078,7 @@
                   <a:spcPct val="0"/>
                 </a:spcAft>
               </a:pPr>
-              <a:t>12/6/2015 8:27 PM</a:t>
+              <a:t>12/6/2015 9:06 PM</a:t>
             </a:fld>
             <a:endParaRPr lang="en-US"/>
           </a:p>
@@ -28114,7 +28114,6 @@
               <a:rPr lang="en-US" dirty="0" smtClean="0"/>
               <a:t>Konstantin Kichinsky</a:t>
             </a:r>
-            <a:endParaRPr lang="en-US" dirty="0" smtClean="0"/>
           </a:p>
           <a:p>
             <a:r>
@@ -28370,15 +28369,7 @@
                   <a:schemeClr val="bg1"/>
                 </a:solidFill>
               </a:rPr>
-              <a:t>C</a:t>
-            </a:r>
-            <a:r>
-              <a:rPr lang="en-US" dirty="0" smtClean="0">
-                <a:solidFill>
-                  <a:schemeClr val="bg1"/>
-                </a:solidFill>
-              </a:rPr>
-              <a:t>#/XAML</a:t>
+              <a:t>C#/XAML</a:t>
             </a:r>
             <a:endParaRPr lang="ru-RU" dirty="0">
               <a:solidFill>
@@ -28710,11 +28701,7 @@
             <a:p>
               <a:r>
                 <a:rPr lang="en-US" dirty="0" smtClean="0"/>
-                <a:t>Starting with Windows </a:t>
-              </a:r>
-              <a:r>
-                <a:rPr lang="en-US" dirty="0" smtClean="0"/>
-                <a:t>8, Windows Phone 8.1</a:t>
+                <a:t>Starting with Windows 8, Windows Phone 8.1</a:t>
               </a:r>
               <a:endParaRPr lang="ru-RU" dirty="0"/>
             </a:p>
@@ -28999,11 +28986,7 @@
             <a:p>
               <a:r>
                 <a:rPr lang="en-US" dirty="0" smtClean="0"/>
-                <a:t>Starting with Windows </a:t>
-              </a:r>
-              <a:r>
-                <a:rPr lang="en-US" dirty="0" smtClean="0"/>
-                <a:t>10</a:t>
+                <a:t>Starting with Windows 10</a:t>
               </a:r>
               <a:r>
                 <a:rPr lang="ru-RU" dirty="0" smtClean="0"/>
@@ -29446,7 +29429,6 @@
               <a:rPr lang="en-US" dirty="0" smtClean="0"/>
               <a:t>Reusing current investments </a:t>
             </a:r>
-            <a:endParaRPr lang="en-US" dirty="0" smtClean="0"/>
           </a:p>
           <a:p>
             <a:pPr lvl="1"/>
@@ -29465,14 +29447,12 @@
               <a:rPr lang="en-US" dirty="0" smtClean="0"/>
               <a:t>Responsive design and adaptation to mobile scenarios</a:t>
             </a:r>
-            <a:endParaRPr lang="en-US" dirty="0" smtClean="0"/>
           </a:p>
           <a:p>
             <a:r>
               <a:rPr lang="en-US" dirty="0" smtClean="0"/>
               <a:t>Flexibility in updating</a:t>
             </a:r>
-            <a:endParaRPr lang="en-US" dirty="0" smtClean="0"/>
           </a:p>
           <a:p>
             <a:pPr lvl="1"/>
@@ -29486,11 +29466,7 @@
             </a:r>
             <a:r>
               <a:rPr lang="en-US" dirty="0" smtClean="0"/>
-              <a:t>Windows </a:t>
-            </a:r>
-            <a:r>
-              <a:rPr lang="en-US" dirty="0" smtClean="0"/>
-              <a:t>Store</a:t>
+              <a:t>Windows Store</a:t>
             </a:r>
             <a:r>
               <a:rPr lang="ru-RU" dirty="0" smtClean="0"/>
@@ -31950,11 +31926,7 @@
           <a:p>
             <a:r>
               <a:rPr lang="en-US" dirty="0" smtClean="0"/>
-              <a:t>Full access to the Universal </a:t>
-            </a:r>
-            <a:r>
-              <a:rPr lang="en-US" dirty="0" smtClean="0"/>
-              <a:t>Windows Platform</a:t>
+              <a:t>Full access to the Universal Windows Platform</a:t>
             </a:r>
           </a:p>
           <a:p>
@@ -31963,7 +31935,6 @@
               <a:rPr lang="en-US" dirty="0" smtClean="0"/>
               <a:t>Access rules managed thru app manifest</a:t>
             </a:r>
-            <a:endParaRPr lang="en-US" dirty="0" smtClean="0"/>
           </a:p>
         </p:txBody>
       </p:sp>
@@ -32824,23 +32795,17 @@
               <a:rPr lang="ru-RU" dirty="0" smtClean="0"/>
               <a:t>).</a:t>
             </a:r>
-            <a:endParaRPr lang="ru-RU" dirty="0" smtClean="0"/>
           </a:p>
           <a:p>
             <a:pPr lvl="1"/>
             <a:r>
               <a:rPr lang="en-US" dirty="0" smtClean="0"/>
-              <a:t>HTML/CSS markup is easier (e.g. </a:t>
-            </a:r>
-            <a:r>
-              <a:rPr lang="en-US" dirty="0" smtClean="0"/>
-              <a:t>complex text</a:t>
+              <a:t>HTML/CSS markup is easier (e.g. complex text</a:t>
             </a:r>
             <a:r>
               <a:rPr lang="ru-RU" dirty="0" smtClean="0"/>
               <a:t>).</a:t>
             </a:r>
-            <a:endParaRPr lang="ru-RU" dirty="0" smtClean="0"/>
           </a:p>
           <a:p>
             <a:pPr lvl="1"/>
@@ -33104,7 +33069,6 @@
               <a:rPr lang="ru-RU" dirty="0"/>
               <a:t>?</a:t>
             </a:r>
-            <a:endParaRPr lang="ru-RU" dirty="0"/>
           </a:p>
         </p:txBody>
       </p:sp>
@@ -33159,7 +33123,6 @@
               <a:rPr lang="ru-RU" dirty="0" smtClean="0"/>
               <a:t>).</a:t>
             </a:r>
-            <a:endParaRPr lang="ru-RU" dirty="0" smtClean="0"/>
           </a:p>
           <a:p>
             <a:pPr lvl="1"/>
@@ -33427,7 +33390,6 @@
               <a:rPr lang="ru-RU" dirty="0"/>
               <a:t>?</a:t>
             </a:r>
-            <a:endParaRPr lang="ru-RU" dirty="0"/>
           </a:p>
         </p:txBody>
       </p:sp>
@@ -33497,7 +33459,6 @@
               <a:rPr lang="ru-RU" dirty="0" smtClean="0"/>
               <a:t>).</a:t>
             </a:r>
-            <a:endParaRPr lang="ru-RU" dirty="0" smtClean="0"/>
           </a:p>
         </p:txBody>
       </p:sp>
@@ -33802,17 +33763,7 @@
                   </a:schemeClr>
                 </a:solidFill>
               </a:rPr>
-              <a:t>&lt;!– </a:t>
-            </a:r>
-            <a:r>
-              <a:rPr lang="en-US" dirty="0" smtClean="0">
-                <a:solidFill>
-                  <a:schemeClr val="accent5">
-                    <a:lumMod val="75000"/>
-                  </a:schemeClr>
-                </a:solidFill>
-              </a:rPr>
-              <a:t>Files in app package. </a:t>
+              <a:t>&lt;!– Files in app package. </a:t>
             </a:r>
             <a:r>
               <a:rPr lang="en-US" dirty="0">
@@ -34068,379 +34019,6 @@
       <p:transition/>
     </mc:Fallback>
   </mc:AlternateContent>
-  <p:timing>
-    <p:tnLst>
-      <p:par>
-        <p:cTn id="1" dur="indefinite" restart="never" nodeType="tmRoot">
-          <p:childTnLst>
-            <p:seq concurrent="1" nextAc="seek">
-              <p:cTn id="2" dur="indefinite" nodeType="mainSeq">
-                <p:childTnLst>
-                  <p:par>
-                    <p:cTn id="3" fill="hold">
-                      <p:stCondLst>
-                        <p:cond delay="indefinite"/>
-                      </p:stCondLst>
-                      <p:childTnLst>
-                        <p:par>
-                          <p:cTn id="4" fill="hold">
-                            <p:stCondLst>
-                              <p:cond delay="0"/>
-                            </p:stCondLst>
-                            <p:childTnLst>
-                              <p:par>
-                                <p:cTn id="5" presetID="1" presetClass="entr" presetSubtype="0" fill="hold" nodeType="clickEffect">
-                                  <p:stCondLst>
-                                    <p:cond delay="0"/>
-                                  </p:stCondLst>
-                                  <p:childTnLst>
-                                    <p:set>
-                                      <p:cBhvr>
-                                        <p:cTn id="6" dur="1" fill="hold">
-                                          <p:stCondLst>
-                                            <p:cond delay="0"/>
-                                          </p:stCondLst>
-                                        </p:cTn>
-                                        <p:tgtEl>
-                                          <p:spTgt spid="4">
-                                            <p:txEl>
-                                              <p:pRg st="0" end="0"/>
-                                            </p:txEl>
-                                          </p:spTgt>
-                                        </p:tgtEl>
-                                        <p:attrNameLst>
-                                          <p:attrName>style.visibility</p:attrName>
-                                        </p:attrNameLst>
-                                      </p:cBhvr>
-                                      <p:to>
-                                        <p:strVal val="visible"/>
-                                      </p:to>
-                                    </p:set>
-                                  </p:childTnLst>
-                                </p:cTn>
-                              </p:par>
-                            </p:childTnLst>
-                          </p:cTn>
-                        </p:par>
-                      </p:childTnLst>
-                    </p:cTn>
-                  </p:par>
-                  <p:par>
-                    <p:cTn id="7" fill="hold">
-                      <p:stCondLst>
-                        <p:cond delay="indefinite"/>
-                      </p:stCondLst>
-                      <p:childTnLst>
-                        <p:par>
-                          <p:cTn id="8" fill="hold">
-                            <p:stCondLst>
-                              <p:cond delay="0"/>
-                            </p:stCondLst>
-                            <p:childTnLst>
-                              <p:par>
-                                <p:cTn id="9" presetID="1" presetClass="entr" presetSubtype="0" fill="hold" nodeType="clickEffect">
-                                  <p:stCondLst>
-                                    <p:cond delay="0"/>
-                                  </p:stCondLst>
-                                  <p:childTnLst>
-                                    <p:set>
-                                      <p:cBhvr>
-                                        <p:cTn id="10" dur="1" fill="hold">
-                                          <p:stCondLst>
-                                            <p:cond delay="0"/>
-                                          </p:stCondLst>
-                                        </p:cTn>
-                                        <p:tgtEl>
-                                          <p:spTgt spid="4">
-                                            <p:txEl>
-                                              <p:pRg st="1" end="1"/>
-                                            </p:txEl>
-                                          </p:spTgt>
-                                        </p:tgtEl>
-                                        <p:attrNameLst>
-                                          <p:attrName>style.visibility</p:attrName>
-                                        </p:attrNameLst>
-                                      </p:cBhvr>
-                                      <p:to>
-                                        <p:strVal val="visible"/>
-                                      </p:to>
-                                    </p:set>
-                                  </p:childTnLst>
-                                </p:cTn>
-                              </p:par>
-                            </p:childTnLst>
-                          </p:cTn>
-                        </p:par>
-                      </p:childTnLst>
-                    </p:cTn>
-                  </p:par>
-                  <p:par>
-                    <p:cTn id="11" fill="hold">
-                      <p:stCondLst>
-                        <p:cond delay="indefinite"/>
-                      </p:stCondLst>
-                      <p:childTnLst>
-                        <p:par>
-                          <p:cTn id="12" fill="hold">
-                            <p:stCondLst>
-                              <p:cond delay="0"/>
-                            </p:stCondLst>
-                            <p:childTnLst>
-                              <p:par>
-                                <p:cTn id="13" presetID="1" presetClass="entr" presetSubtype="0" fill="hold" nodeType="clickEffect">
-                                  <p:stCondLst>
-                                    <p:cond delay="0"/>
-                                  </p:stCondLst>
-                                  <p:childTnLst>
-                                    <p:set>
-                                      <p:cBhvr>
-                                        <p:cTn id="14" dur="1" fill="hold">
-                                          <p:stCondLst>
-                                            <p:cond delay="0"/>
-                                          </p:stCondLst>
-                                        </p:cTn>
-                                        <p:tgtEl>
-                                          <p:spTgt spid="4">
-                                            <p:txEl>
-                                              <p:pRg st="2" end="2"/>
-                                            </p:txEl>
-                                          </p:spTgt>
-                                        </p:tgtEl>
-                                        <p:attrNameLst>
-                                          <p:attrName>style.visibility</p:attrName>
-                                        </p:attrNameLst>
-                                      </p:cBhvr>
-                                      <p:to>
-                                        <p:strVal val="visible"/>
-                                      </p:to>
-                                    </p:set>
-                                  </p:childTnLst>
-                                </p:cTn>
-                              </p:par>
-                            </p:childTnLst>
-                          </p:cTn>
-                        </p:par>
-                      </p:childTnLst>
-                    </p:cTn>
-                  </p:par>
-                  <p:par>
-                    <p:cTn id="15" fill="hold">
-                      <p:stCondLst>
-                        <p:cond delay="indefinite"/>
-                      </p:stCondLst>
-                      <p:childTnLst>
-                        <p:par>
-                          <p:cTn id="16" fill="hold">
-                            <p:stCondLst>
-                              <p:cond delay="0"/>
-                            </p:stCondLst>
-                            <p:childTnLst>
-                              <p:par>
-                                <p:cTn id="17" presetID="1" presetClass="entr" presetSubtype="0" fill="hold" nodeType="clickEffect">
-                                  <p:stCondLst>
-                                    <p:cond delay="0"/>
-                                  </p:stCondLst>
-                                  <p:childTnLst>
-                                    <p:set>
-                                      <p:cBhvr>
-                                        <p:cTn id="18" dur="1" fill="hold">
-                                          <p:stCondLst>
-                                            <p:cond delay="0"/>
-                                          </p:stCondLst>
-                                        </p:cTn>
-                                        <p:tgtEl>
-                                          <p:spTgt spid="4">
-                                            <p:txEl>
-                                              <p:pRg st="4" end="4"/>
-                                            </p:txEl>
-                                          </p:spTgt>
-                                        </p:tgtEl>
-                                        <p:attrNameLst>
-                                          <p:attrName>style.visibility</p:attrName>
-                                        </p:attrNameLst>
-                                      </p:cBhvr>
-                                      <p:to>
-                                        <p:strVal val="visible"/>
-                                      </p:to>
-                                    </p:set>
-                                  </p:childTnLst>
-                                </p:cTn>
-                              </p:par>
-                            </p:childTnLst>
-                          </p:cTn>
-                        </p:par>
-                      </p:childTnLst>
-                    </p:cTn>
-                  </p:par>
-                  <p:par>
-                    <p:cTn id="19" fill="hold">
-                      <p:stCondLst>
-                        <p:cond delay="indefinite"/>
-                      </p:stCondLst>
-                      <p:childTnLst>
-                        <p:par>
-                          <p:cTn id="20" fill="hold">
-                            <p:stCondLst>
-                              <p:cond delay="0"/>
-                            </p:stCondLst>
-                            <p:childTnLst>
-                              <p:par>
-                                <p:cTn id="21" presetID="1" presetClass="entr" presetSubtype="0" fill="hold" nodeType="clickEffect">
-                                  <p:stCondLst>
-                                    <p:cond delay="0"/>
-                                  </p:stCondLst>
-                                  <p:childTnLst>
-                                    <p:set>
-                                      <p:cBhvr>
-                                        <p:cTn id="22" dur="1" fill="hold">
-                                          <p:stCondLst>
-                                            <p:cond delay="0"/>
-                                          </p:stCondLst>
-                                        </p:cTn>
-                                        <p:tgtEl>
-                                          <p:spTgt spid="4">
-                                            <p:txEl>
-                                              <p:pRg st="5" end="5"/>
-                                            </p:txEl>
-                                          </p:spTgt>
-                                        </p:tgtEl>
-                                        <p:attrNameLst>
-                                          <p:attrName>style.visibility</p:attrName>
-                                        </p:attrNameLst>
-                                      </p:cBhvr>
-                                      <p:to>
-                                        <p:strVal val="visible"/>
-                                      </p:to>
-                                    </p:set>
-                                  </p:childTnLst>
-                                </p:cTn>
-                              </p:par>
-                            </p:childTnLst>
-                          </p:cTn>
-                        </p:par>
-                      </p:childTnLst>
-                    </p:cTn>
-                  </p:par>
-                  <p:par>
-                    <p:cTn id="23" fill="hold">
-                      <p:stCondLst>
-                        <p:cond delay="indefinite"/>
-                      </p:stCondLst>
-                      <p:childTnLst>
-                        <p:par>
-                          <p:cTn id="24" fill="hold">
-                            <p:stCondLst>
-                              <p:cond delay="0"/>
-                            </p:stCondLst>
-                            <p:childTnLst>
-                              <p:par>
-                                <p:cTn id="25" presetID="1" presetClass="entr" presetSubtype="0" fill="hold" nodeType="clickEffect">
-                                  <p:stCondLst>
-                                    <p:cond delay="0"/>
-                                  </p:stCondLst>
-                                  <p:childTnLst>
-                                    <p:set>
-                                      <p:cBhvr>
-                                        <p:cTn id="26" dur="1" fill="hold">
-                                          <p:stCondLst>
-                                            <p:cond delay="0"/>
-                                          </p:stCondLst>
-                                        </p:cTn>
-                                        <p:tgtEl>
-                                          <p:spTgt spid="4">
-                                            <p:txEl>
-                                              <p:pRg st="7" end="7"/>
-                                            </p:txEl>
-                                          </p:spTgt>
-                                        </p:tgtEl>
-                                        <p:attrNameLst>
-                                          <p:attrName>style.visibility</p:attrName>
-                                        </p:attrNameLst>
-                                      </p:cBhvr>
-                                      <p:to>
-                                        <p:strVal val="visible"/>
-                                      </p:to>
-                                    </p:set>
-                                  </p:childTnLst>
-                                </p:cTn>
-                              </p:par>
-                            </p:childTnLst>
-                          </p:cTn>
-                        </p:par>
-                      </p:childTnLst>
-                    </p:cTn>
-                  </p:par>
-                  <p:par>
-                    <p:cTn id="27" fill="hold">
-                      <p:stCondLst>
-                        <p:cond delay="indefinite"/>
-                      </p:stCondLst>
-                      <p:childTnLst>
-                        <p:par>
-                          <p:cTn id="28" fill="hold">
-                            <p:stCondLst>
-                              <p:cond delay="0"/>
-                            </p:stCondLst>
-                            <p:childTnLst>
-                              <p:par>
-                                <p:cTn id="29" presetID="1" presetClass="entr" presetSubtype="0" fill="hold" nodeType="clickEffect">
-                                  <p:stCondLst>
-                                    <p:cond delay="0"/>
-                                  </p:stCondLst>
-                                  <p:childTnLst>
-                                    <p:set>
-                                      <p:cBhvr>
-                                        <p:cTn id="30" dur="1" fill="hold">
-                                          <p:stCondLst>
-                                            <p:cond delay="0"/>
-                                          </p:stCondLst>
-                                        </p:cTn>
-                                        <p:tgtEl>
-                                          <p:spTgt spid="4">
-                                            <p:txEl>
-                                              <p:pRg st="8" end="8"/>
-                                            </p:txEl>
-                                          </p:spTgt>
-                                        </p:tgtEl>
-                                        <p:attrNameLst>
-                                          <p:attrName>style.visibility</p:attrName>
-                                        </p:attrNameLst>
-                                      </p:cBhvr>
-                                      <p:to>
-                                        <p:strVal val="visible"/>
-                                      </p:to>
-                                    </p:set>
-                                  </p:childTnLst>
-                                </p:cTn>
-                              </p:par>
-                            </p:childTnLst>
-                          </p:cTn>
-                        </p:par>
-                      </p:childTnLst>
-                    </p:cTn>
-                  </p:par>
-                </p:childTnLst>
-              </p:cTn>
-              <p:prevCondLst>
-                <p:cond evt="onPrev" delay="0">
-                  <p:tgtEl>
-                    <p:sldTgt/>
-                  </p:tgtEl>
-                </p:cond>
-              </p:prevCondLst>
-              <p:nextCondLst>
-                <p:cond evt="onNext" delay="0">
-                  <p:tgtEl>
-                    <p:sldTgt/>
-                  </p:tgtEl>
-                </p:cond>
-              </p:nextCondLst>
-            </p:seq>
-          </p:childTnLst>
-        </p:cTn>
-      </p:par>
-    </p:tnLst>
-  </p:timing>
 </p:sld>
 </file>
 
@@ -34757,624 +34335,6 @@
       <p:transition/>
     </mc:Fallback>
   </mc:AlternateContent>
-  <p:timing>
-    <p:tnLst>
-      <p:par>
-        <p:cTn id="1" dur="indefinite" restart="never" nodeType="tmRoot">
-          <p:childTnLst>
-            <p:seq concurrent="1" nextAc="seek">
-              <p:cTn id="2" dur="indefinite" nodeType="mainSeq">
-                <p:childTnLst>
-                  <p:par>
-                    <p:cTn id="3" fill="hold">
-                      <p:stCondLst>
-                        <p:cond delay="indefinite"/>
-                      </p:stCondLst>
-                      <p:childTnLst>
-                        <p:par>
-                          <p:cTn id="4" fill="hold">
-                            <p:stCondLst>
-                              <p:cond delay="0"/>
-                            </p:stCondLst>
-                            <p:childTnLst>
-                              <p:par>
-                                <p:cTn id="5" presetID="1" presetClass="entr" presetSubtype="0" fill="hold" nodeType="clickEffect">
-                                  <p:stCondLst>
-                                    <p:cond delay="0"/>
-                                  </p:stCondLst>
-                                  <p:childTnLst>
-                                    <p:set>
-                                      <p:cBhvr>
-                                        <p:cTn id="6" dur="1" fill="hold">
-                                          <p:stCondLst>
-                                            <p:cond delay="0"/>
-                                          </p:stCondLst>
-                                        </p:cTn>
-                                        <p:tgtEl>
-                                          <p:spTgt spid="4">
-                                            <p:txEl>
-                                              <p:pRg st="1" end="1"/>
-                                            </p:txEl>
-                                          </p:spTgt>
-                                        </p:tgtEl>
-                                        <p:attrNameLst>
-                                          <p:attrName>style.visibility</p:attrName>
-                                        </p:attrNameLst>
-                                      </p:cBhvr>
-                                      <p:to>
-                                        <p:strVal val="visible"/>
-                                      </p:to>
-                                    </p:set>
-                                  </p:childTnLst>
-                                </p:cTn>
-                              </p:par>
-                            </p:childTnLst>
-                          </p:cTn>
-                        </p:par>
-                      </p:childTnLst>
-                    </p:cTn>
-                  </p:par>
-                  <p:par>
-                    <p:cTn id="7" fill="hold">
-                      <p:stCondLst>
-                        <p:cond delay="indefinite"/>
-                      </p:stCondLst>
-                      <p:childTnLst>
-                        <p:par>
-                          <p:cTn id="8" fill="hold">
-                            <p:stCondLst>
-                              <p:cond delay="0"/>
-                            </p:stCondLst>
-                            <p:childTnLst>
-                              <p:par>
-                                <p:cTn id="9" presetID="1" presetClass="entr" presetSubtype="0" fill="hold" nodeType="clickEffect">
-                                  <p:stCondLst>
-                                    <p:cond delay="0"/>
-                                  </p:stCondLst>
-                                  <p:childTnLst>
-                                    <p:set>
-                                      <p:cBhvr>
-                                        <p:cTn id="10" dur="1" fill="hold">
-                                          <p:stCondLst>
-                                            <p:cond delay="0"/>
-                                          </p:stCondLst>
-                                        </p:cTn>
-                                        <p:tgtEl>
-                                          <p:spTgt spid="4">
-                                            <p:txEl>
-                                              <p:pRg st="3" end="3"/>
-                                            </p:txEl>
-                                          </p:spTgt>
-                                        </p:tgtEl>
-                                        <p:attrNameLst>
-                                          <p:attrName>style.visibility</p:attrName>
-                                        </p:attrNameLst>
-                                      </p:cBhvr>
-                                      <p:to>
-                                        <p:strVal val="visible"/>
-                                      </p:to>
-                                    </p:set>
-                                  </p:childTnLst>
-                                </p:cTn>
-                              </p:par>
-                            </p:childTnLst>
-                          </p:cTn>
-                        </p:par>
-                      </p:childTnLst>
-                    </p:cTn>
-                  </p:par>
-                  <p:par>
-                    <p:cTn id="11" fill="hold">
-                      <p:stCondLst>
-                        <p:cond delay="indefinite"/>
-                      </p:stCondLst>
-                      <p:childTnLst>
-                        <p:par>
-                          <p:cTn id="12" fill="hold">
-                            <p:stCondLst>
-                              <p:cond delay="0"/>
-                            </p:stCondLst>
-                            <p:childTnLst>
-                              <p:par>
-                                <p:cTn id="13" presetID="1" presetClass="entr" presetSubtype="0" fill="hold" nodeType="clickEffect">
-                                  <p:stCondLst>
-                                    <p:cond delay="0"/>
-                                  </p:stCondLst>
-                                  <p:childTnLst>
-                                    <p:set>
-                                      <p:cBhvr>
-                                        <p:cTn id="14" dur="1" fill="hold">
-                                          <p:stCondLst>
-                                            <p:cond delay="0"/>
-                                          </p:stCondLst>
-                                        </p:cTn>
-                                        <p:tgtEl>
-                                          <p:spTgt spid="4">
-                                            <p:txEl>
-                                              <p:pRg st="4" end="4"/>
-                                            </p:txEl>
-                                          </p:spTgt>
-                                        </p:tgtEl>
-                                        <p:attrNameLst>
-                                          <p:attrName>style.visibility</p:attrName>
-                                        </p:attrNameLst>
-                                      </p:cBhvr>
-                                      <p:to>
-                                        <p:strVal val="visible"/>
-                                      </p:to>
-                                    </p:set>
-                                  </p:childTnLst>
-                                </p:cTn>
-                              </p:par>
-                            </p:childTnLst>
-                          </p:cTn>
-                        </p:par>
-                      </p:childTnLst>
-                    </p:cTn>
-                  </p:par>
-                  <p:par>
-                    <p:cTn id="15" fill="hold">
-                      <p:stCondLst>
-                        <p:cond delay="indefinite"/>
-                      </p:stCondLst>
-                      <p:childTnLst>
-                        <p:par>
-                          <p:cTn id="16" fill="hold">
-                            <p:stCondLst>
-                              <p:cond delay="0"/>
-                            </p:stCondLst>
-                            <p:childTnLst>
-                              <p:par>
-                                <p:cTn id="17" presetID="1" presetClass="entr" presetSubtype="0" fill="hold" nodeType="clickEffect">
-                                  <p:stCondLst>
-                                    <p:cond delay="0"/>
-                                  </p:stCondLst>
-                                  <p:childTnLst>
-                                    <p:set>
-                                      <p:cBhvr>
-                                        <p:cTn id="18" dur="1" fill="hold">
-                                          <p:stCondLst>
-                                            <p:cond delay="0"/>
-                                          </p:stCondLst>
-                                        </p:cTn>
-                                        <p:tgtEl>
-                                          <p:spTgt spid="4">
-                                            <p:txEl>
-                                              <p:pRg st="6" end="6"/>
-                                            </p:txEl>
-                                          </p:spTgt>
-                                        </p:tgtEl>
-                                        <p:attrNameLst>
-                                          <p:attrName>style.visibility</p:attrName>
-                                        </p:attrNameLst>
-                                      </p:cBhvr>
-                                      <p:to>
-                                        <p:strVal val="visible"/>
-                                      </p:to>
-                                    </p:set>
-                                  </p:childTnLst>
-                                </p:cTn>
-                              </p:par>
-                            </p:childTnLst>
-                          </p:cTn>
-                        </p:par>
-                      </p:childTnLst>
-                    </p:cTn>
-                  </p:par>
-                  <p:par>
-                    <p:cTn id="19" fill="hold">
-                      <p:stCondLst>
-                        <p:cond delay="indefinite"/>
-                      </p:stCondLst>
-                      <p:childTnLst>
-                        <p:par>
-                          <p:cTn id="20" fill="hold">
-                            <p:stCondLst>
-                              <p:cond delay="0"/>
-                            </p:stCondLst>
-                            <p:childTnLst>
-                              <p:par>
-                                <p:cTn id="21" presetID="1" presetClass="entr" presetSubtype="0" fill="hold" nodeType="clickEffect">
-                                  <p:stCondLst>
-                                    <p:cond delay="0"/>
-                                  </p:stCondLst>
-                                  <p:childTnLst>
-                                    <p:set>
-                                      <p:cBhvr>
-                                        <p:cTn id="22" dur="1" fill="hold">
-                                          <p:stCondLst>
-                                            <p:cond delay="0"/>
-                                          </p:stCondLst>
-                                        </p:cTn>
-                                        <p:tgtEl>
-                                          <p:spTgt spid="4">
-                                            <p:txEl>
-                                              <p:pRg st="7" end="7"/>
-                                            </p:txEl>
-                                          </p:spTgt>
-                                        </p:tgtEl>
-                                        <p:attrNameLst>
-                                          <p:attrName>style.visibility</p:attrName>
-                                        </p:attrNameLst>
-                                      </p:cBhvr>
-                                      <p:to>
-                                        <p:strVal val="visible"/>
-                                      </p:to>
-                                    </p:set>
-                                  </p:childTnLst>
-                                </p:cTn>
-                              </p:par>
-                            </p:childTnLst>
-                          </p:cTn>
-                        </p:par>
-                      </p:childTnLst>
-                    </p:cTn>
-                  </p:par>
-                  <p:par>
-                    <p:cTn id="23" fill="hold">
-                      <p:stCondLst>
-                        <p:cond delay="indefinite"/>
-                      </p:stCondLst>
-                      <p:childTnLst>
-                        <p:par>
-                          <p:cTn id="24" fill="hold">
-                            <p:stCondLst>
-                              <p:cond delay="0"/>
-                            </p:stCondLst>
-                            <p:childTnLst>
-                              <p:par>
-                                <p:cTn id="25" presetID="1" presetClass="entr" presetSubtype="0" fill="hold" nodeType="clickEffect">
-                                  <p:stCondLst>
-                                    <p:cond delay="0"/>
-                                  </p:stCondLst>
-                                  <p:childTnLst>
-                                    <p:set>
-                                      <p:cBhvr>
-                                        <p:cTn id="26" dur="1" fill="hold">
-                                          <p:stCondLst>
-                                            <p:cond delay="0"/>
-                                          </p:stCondLst>
-                                        </p:cTn>
-                                        <p:tgtEl>
-                                          <p:spTgt spid="4">
-                                            <p:txEl>
-                                              <p:pRg st="8" end="8"/>
-                                            </p:txEl>
-                                          </p:spTgt>
-                                        </p:tgtEl>
-                                        <p:attrNameLst>
-                                          <p:attrName>style.visibility</p:attrName>
-                                        </p:attrNameLst>
-                                      </p:cBhvr>
-                                      <p:to>
-                                        <p:strVal val="visible"/>
-                                      </p:to>
-                                    </p:set>
-                                  </p:childTnLst>
-                                </p:cTn>
-                              </p:par>
-                            </p:childTnLst>
-                          </p:cTn>
-                        </p:par>
-                      </p:childTnLst>
-                    </p:cTn>
-                  </p:par>
-                  <p:par>
-                    <p:cTn id="27" fill="hold">
-                      <p:stCondLst>
-                        <p:cond delay="indefinite"/>
-                      </p:stCondLst>
-                      <p:childTnLst>
-                        <p:par>
-                          <p:cTn id="28" fill="hold">
-                            <p:stCondLst>
-                              <p:cond delay="0"/>
-                            </p:stCondLst>
-                            <p:childTnLst>
-                              <p:par>
-                                <p:cTn id="29" presetID="1" presetClass="entr" presetSubtype="0" fill="hold" nodeType="clickEffect">
-                                  <p:stCondLst>
-                                    <p:cond delay="0"/>
-                                  </p:stCondLst>
-                                  <p:childTnLst>
-                                    <p:set>
-                                      <p:cBhvr>
-                                        <p:cTn id="30" dur="1" fill="hold">
-                                          <p:stCondLst>
-                                            <p:cond delay="0"/>
-                                          </p:stCondLst>
-                                        </p:cTn>
-                                        <p:tgtEl>
-                                          <p:spTgt spid="4">
-                                            <p:txEl>
-                                              <p:pRg st="9" end="9"/>
-                                            </p:txEl>
-                                          </p:spTgt>
-                                        </p:tgtEl>
-                                        <p:attrNameLst>
-                                          <p:attrName>style.visibility</p:attrName>
-                                        </p:attrNameLst>
-                                      </p:cBhvr>
-                                      <p:to>
-                                        <p:strVal val="visible"/>
-                                      </p:to>
-                                    </p:set>
-                                  </p:childTnLst>
-                                </p:cTn>
-                              </p:par>
-                            </p:childTnLst>
-                          </p:cTn>
-                        </p:par>
-                      </p:childTnLst>
-                    </p:cTn>
-                  </p:par>
-                  <p:par>
-                    <p:cTn id="31" fill="hold">
-                      <p:stCondLst>
-                        <p:cond delay="indefinite"/>
-                      </p:stCondLst>
-                      <p:childTnLst>
-                        <p:par>
-                          <p:cTn id="32" fill="hold">
-                            <p:stCondLst>
-                              <p:cond delay="0"/>
-                            </p:stCondLst>
-                            <p:childTnLst>
-                              <p:par>
-                                <p:cTn id="33" presetID="1" presetClass="entr" presetSubtype="0" fill="hold" nodeType="clickEffect">
-                                  <p:stCondLst>
-                                    <p:cond delay="0"/>
-                                  </p:stCondLst>
-                                  <p:childTnLst>
-                                    <p:set>
-                                      <p:cBhvr>
-                                        <p:cTn id="34" dur="1" fill="hold">
-                                          <p:stCondLst>
-                                            <p:cond delay="0"/>
-                                          </p:stCondLst>
-                                        </p:cTn>
-                                        <p:tgtEl>
-                                          <p:spTgt spid="4">
-                                            <p:txEl>
-                                              <p:pRg st="10" end="10"/>
-                                            </p:txEl>
-                                          </p:spTgt>
-                                        </p:tgtEl>
-                                        <p:attrNameLst>
-                                          <p:attrName>style.visibility</p:attrName>
-                                        </p:attrNameLst>
-                                      </p:cBhvr>
-                                      <p:to>
-                                        <p:strVal val="visible"/>
-                                      </p:to>
-                                    </p:set>
-                                  </p:childTnLst>
-                                </p:cTn>
-                              </p:par>
-                            </p:childTnLst>
-                          </p:cTn>
-                        </p:par>
-                      </p:childTnLst>
-                    </p:cTn>
-                  </p:par>
-                  <p:par>
-                    <p:cTn id="35" fill="hold">
-                      <p:stCondLst>
-                        <p:cond delay="indefinite"/>
-                      </p:stCondLst>
-                      <p:childTnLst>
-                        <p:par>
-                          <p:cTn id="36" fill="hold">
-                            <p:stCondLst>
-                              <p:cond delay="0"/>
-                            </p:stCondLst>
-                            <p:childTnLst>
-                              <p:par>
-                                <p:cTn id="37" presetID="1" presetClass="entr" presetSubtype="0" fill="hold" nodeType="clickEffect">
-                                  <p:stCondLst>
-                                    <p:cond delay="0"/>
-                                  </p:stCondLst>
-                                  <p:childTnLst>
-                                    <p:set>
-                                      <p:cBhvr>
-                                        <p:cTn id="38" dur="1" fill="hold">
-                                          <p:stCondLst>
-                                            <p:cond delay="0"/>
-                                          </p:stCondLst>
-                                        </p:cTn>
-                                        <p:tgtEl>
-                                          <p:spTgt spid="4">
-                                            <p:txEl>
-                                              <p:pRg st="11" end="11"/>
-                                            </p:txEl>
-                                          </p:spTgt>
-                                        </p:tgtEl>
-                                        <p:attrNameLst>
-                                          <p:attrName>style.visibility</p:attrName>
-                                        </p:attrNameLst>
-                                      </p:cBhvr>
-                                      <p:to>
-                                        <p:strVal val="visible"/>
-                                      </p:to>
-                                    </p:set>
-                                  </p:childTnLst>
-                                </p:cTn>
-                              </p:par>
-                            </p:childTnLst>
-                          </p:cTn>
-                        </p:par>
-                      </p:childTnLst>
-                    </p:cTn>
-                  </p:par>
-                  <p:par>
-                    <p:cTn id="39" fill="hold">
-                      <p:stCondLst>
-                        <p:cond delay="indefinite"/>
-                      </p:stCondLst>
-                      <p:childTnLst>
-                        <p:par>
-                          <p:cTn id="40" fill="hold">
-                            <p:stCondLst>
-                              <p:cond delay="0"/>
-                            </p:stCondLst>
-                            <p:childTnLst>
-                              <p:par>
-                                <p:cTn id="41" presetID="1" presetClass="entr" presetSubtype="0" fill="hold" nodeType="clickEffect">
-                                  <p:stCondLst>
-                                    <p:cond delay="0"/>
-                                  </p:stCondLst>
-                                  <p:childTnLst>
-                                    <p:set>
-                                      <p:cBhvr>
-                                        <p:cTn id="42" dur="1" fill="hold">
-                                          <p:stCondLst>
-                                            <p:cond delay="0"/>
-                                          </p:stCondLst>
-                                        </p:cTn>
-                                        <p:tgtEl>
-                                          <p:spTgt spid="4">
-                                            <p:txEl>
-                                              <p:pRg st="12" end="12"/>
-                                            </p:txEl>
-                                          </p:spTgt>
-                                        </p:tgtEl>
-                                        <p:attrNameLst>
-                                          <p:attrName>style.visibility</p:attrName>
-                                        </p:attrNameLst>
-                                      </p:cBhvr>
-                                      <p:to>
-                                        <p:strVal val="visible"/>
-                                      </p:to>
-                                    </p:set>
-                                  </p:childTnLst>
-                                </p:cTn>
-                              </p:par>
-                            </p:childTnLst>
-                          </p:cTn>
-                        </p:par>
-                      </p:childTnLst>
-                    </p:cTn>
-                  </p:par>
-                  <p:par>
-                    <p:cTn id="43" fill="hold">
-                      <p:stCondLst>
-                        <p:cond delay="indefinite"/>
-                      </p:stCondLst>
-                      <p:childTnLst>
-                        <p:par>
-                          <p:cTn id="44" fill="hold">
-                            <p:stCondLst>
-                              <p:cond delay="0"/>
-                            </p:stCondLst>
-                            <p:childTnLst>
-                              <p:par>
-                                <p:cTn id="45" presetID="1" presetClass="entr" presetSubtype="0" fill="hold" nodeType="clickEffect">
-                                  <p:stCondLst>
-                                    <p:cond delay="0"/>
-                                  </p:stCondLst>
-                                  <p:childTnLst>
-                                    <p:set>
-                                      <p:cBhvr>
-                                        <p:cTn id="46" dur="1" fill="hold">
-                                          <p:stCondLst>
-                                            <p:cond delay="0"/>
-                                          </p:stCondLst>
-                                        </p:cTn>
-                                        <p:tgtEl>
-                                          <p:spTgt spid="4">
-                                            <p:txEl>
-                                              <p:pRg st="13" end="13"/>
-                                            </p:txEl>
-                                          </p:spTgt>
-                                        </p:tgtEl>
-                                        <p:attrNameLst>
-                                          <p:attrName>style.visibility</p:attrName>
-                                        </p:attrNameLst>
-                                      </p:cBhvr>
-                                      <p:to>
-                                        <p:strVal val="visible"/>
-                                      </p:to>
-                                    </p:set>
-                                  </p:childTnLst>
-                                </p:cTn>
-                              </p:par>
-                            </p:childTnLst>
-                          </p:cTn>
-                        </p:par>
-                      </p:childTnLst>
-                    </p:cTn>
-                  </p:par>
-                  <p:par>
-                    <p:cTn id="47" fill="hold">
-                      <p:stCondLst>
-                        <p:cond delay="indefinite"/>
-                      </p:stCondLst>
-                      <p:childTnLst>
-                        <p:par>
-                          <p:cTn id="48" fill="hold">
-                            <p:stCondLst>
-                              <p:cond delay="0"/>
-                            </p:stCondLst>
-                            <p:childTnLst>
-                              <p:par>
-                                <p:cTn id="49" presetID="1" presetClass="entr" presetSubtype="0" fill="hold" nodeType="clickEffect">
-                                  <p:stCondLst>
-                                    <p:cond delay="0"/>
-                                  </p:stCondLst>
-                                  <p:childTnLst>
-                                    <p:set>
-                                      <p:cBhvr>
-                                        <p:cTn id="50" dur="1" fill="hold">
-                                          <p:stCondLst>
-                                            <p:cond delay="0"/>
-                                          </p:stCondLst>
-                                        </p:cTn>
-                                        <p:tgtEl>
-                                          <p:spTgt spid="4">
-                                            <p:txEl>
-                                              <p:pRg st="0" end="0"/>
-                                            </p:txEl>
-                                          </p:spTgt>
-                                        </p:tgtEl>
-                                        <p:attrNameLst>
-                                          <p:attrName>style.visibility</p:attrName>
-                                        </p:attrNameLst>
-                                      </p:cBhvr>
-                                      <p:to>
-                                        <p:strVal val="visible"/>
-                                      </p:to>
-                                    </p:set>
-                                  </p:childTnLst>
-                                </p:cTn>
-                              </p:par>
-                            </p:childTnLst>
-                          </p:cTn>
-                        </p:par>
-                      </p:childTnLst>
-                    </p:cTn>
-                  </p:par>
-                </p:childTnLst>
-              </p:cTn>
-              <p:prevCondLst>
-                <p:cond evt="onPrev" delay="0">
-                  <p:tgtEl>
-                    <p:sldTgt/>
-                  </p:tgtEl>
-                </p:cond>
-              </p:prevCondLst>
-              <p:nextCondLst>
-                <p:cond evt="onNext" delay="0">
-                  <p:tgtEl>
-                    <p:sldTgt/>
-                  </p:tgtEl>
-                </p:cond>
-              </p:nextCondLst>
-            </p:seq>
-          </p:childTnLst>
-        </p:cTn>
-      </p:par>
-    </p:tnLst>
-  </p:timing>
 </p:sld>
 </file>
 
@@ -35590,11 +34550,7 @@
           <a:p>
             <a:r>
               <a:rPr lang="en-US" dirty="0" smtClean="0"/>
-              <a:t>The new engine shared with Microsoft </a:t>
-            </a:r>
-            <a:r>
-              <a:rPr lang="en-US" dirty="0" smtClean="0"/>
-              <a:t>Edge</a:t>
+              <a:t>The new engine shared with Microsoft Edge</a:t>
             </a:r>
             <a:endParaRPr lang="ru-RU" dirty="0" smtClean="0"/>
           </a:p>
@@ -36133,11 +35089,7 @@
           <a:p>
             <a:r>
               <a:rPr lang="en-US" dirty="0" smtClean="0"/>
-              <a:t>Interactin</a:t>
-            </a:r>
-            <a:r>
-              <a:rPr lang="en-US" dirty="0" smtClean="0"/>
-              <a:t>g with code inside </a:t>
+              <a:t>Interacting with code inside </a:t>
             </a:r>
             <a:r>
               <a:rPr lang="en-US" dirty="0" err="1" smtClean="0"/>
@@ -36182,11 +35134,7 @@
             </a:r>
             <a:r>
               <a:rPr lang="en-US" dirty="0" smtClean="0"/>
-              <a:t>C# </a:t>
-            </a:r>
-            <a:r>
-              <a:rPr lang="en-US" dirty="0" smtClean="0"/>
-              <a:t>to</a:t>
+              <a:t>C# to</a:t>
             </a:r>
             <a:r>
               <a:rPr lang="ru-RU" dirty="0" smtClean="0"/>
@@ -36233,11 +35181,7 @@
             </a:r>
             <a:r>
               <a:rPr lang="en-US" dirty="0" smtClean="0"/>
-              <a:t>JS </a:t>
-            </a:r>
-            <a:r>
-              <a:rPr lang="en-US" dirty="0" smtClean="0"/>
-              <a:t>to</a:t>
+              <a:t>JS to</a:t>
             </a:r>
             <a:r>
               <a:rPr lang="ru-RU" dirty="0" smtClean="0"/>
@@ -38345,6 +37289,21 @@
 </file>
 
 <file path=customXml/item1.xml><?xml version="1.0" encoding="utf-8"?>
+<p:properties xmlns:p="http://schemas.microsoft.com/office/2006/metadata/properties" xmlns:xsi="http://www.w3.org/2001/XMLSchema-instance" xmlns:pc="http://schemas.microsoft.com/office/infopath/2007/PartnerControls">
+  <documentManagement/>
+</p:properties>
+</file>
+
+<file path=customXml/item2.xml><?xml version="1.0" encoding="utf-8"?>
+<?mso-contentType ?>
+<FormTemplates xmlns="http://schemas.microsoft.com/sharepoint/v3/contenttype/forms">
+  <Display>DocumentLibraryForm</Display>
+  <Edit>DocumentLibraryForm</Edit>
+  <New>DocumentLibraryForm</New>
+</FormTemplates>
+</file>
+
+<file path=customXml/item3.xml><?xml version="1.0" encoding="utf-8"?>
 <ct:contentTypeSchema xmlns:ct="http://schemas.microsoft.com/office/2006/metadata/contentType" xmlns:ma="http://schemas.microsoft.com/office/2006/metadata/properties/metaAttributes" ct:_="" ma:_="" ma:contentTypeName="Document" ma:contentTypeID="0x01010076BDC9AB8D85574E92B3FF85DD8EEE9A" ma:contentTypeVersion="0" ma:contentTypeDescription="Create a new document." ma:contentTypeScope="" ma:versionID="ddc91d68531740eb4ffac8dfd0ac3039">
   <xsd:schema xmlns:xsd="http://www.w3.org/2001/XMLSchema" xmlns:xs="http://www.w3.org/2001/XMLSchema" xmlns:p="http://schemas.microsoft.com/office/2006/metadata/properties" targetNamespace="http://schemas.microsoft.com/office/2006/metadata/properties" ma:root="true" ma:fieldsID="595fb8ec1e0e1cfd5b45b077016c9ed3">
     <xsd:element name="properties">
@@ -38458,22 +37417,30 @@
 </ct:contentTypeSchema>
 </file>
 
-<file path=customXml/item2.xml><?xml version="1.0" encoding="utf-8"?>
-<?mso-contentType ?>
-<FormTemplates xmlns="http://schemas.microsoft.com/sharepoint/v3/contenttype/forms">
-  <Display>DocumentLibraryForm</Display>
-  <Edit>DocumentLibraryForm</Edit>
-  <New>DocumentLibraryForm</New>
-</FormTemplates>
+<file path=customXml/itemProps1.xml><?xml version="1.0" encoding="utf-8"?>
+<ds:datastoreItem xmlns:ds="http://schemas.openxmlformats.org/officeDocument/2006/customXml" ds:itemID="{136497CF-FFDF-4FDB-8278-A4E189869E9B}">
+  <ds:schemaRefs>
+    <ds:schemaRef ds:uri="http://schemas.microsoft.com/office/2006/metadata/properties"/>
+    <ds:schemaRef ds:uri="http://purl.org/dc/terms/"/>
+    <ds:schemaRef ds:uri="http://schemas.openxmlformats.org/package/2006/metadata/core-properties"/>
+    <ds:schemaRef ds:uri="http://schemas.microsoft.com/office/2006/documentManagement/types"/>
+    <ds:schemaRef ds:uri="http://purl.org/dc/dcmitype/"/>
+    <ds:schemaRef ds:uri="http://schemas.microsoft.com/office/infopath/2007/PartnerControls"/>
+    <ds:schemaRef ds:uri="http://purl.org/dc/elements/1.1/"/>
+    <ds:schemaRef ds:uri="http://www.w3.org/XML/1998/namespace"/>
+  </ds:schemaRefs>
+</ds:datastoreItem>
 </file>
 
-<file path=customXml/item3.xml><?xml version="1.0" encoding="utf-8"?>
-<p:properties xmlns:p="http://schemas.microsoft.com/office/2006/metadata/properties" xmlns:xsi="http://www.w3.org/2001/XMLSchema-instance" xmlns:pc="http://schemas.microsoft.com/office/infopath/2007/PartnerControls">
-  <documentManagement/>
-</p:properties>
+<file path=customXml/itemProps2.xml><?xml version="1.0" encoding="utf-8"?>
+<ds:datastoreItem xmlns:ds="http://schemas.openxmlformats.org/officeDocument/2006/customXml" ds:itemID="{1C1284F2-D5A2-482D-9283-38905BD416F7}">
+  <ds:schemaRefs>
+    <ds:schemaRef ds:uri="http://schemas.microsoft.com/sharepoint/v3/contenttype/forms"/>
+  </ds:schemaRefs>
+</ds:datastoreItem>
 </file>
 
-<file path=customXml/itemProps1.xml><?xml version="1.0" encoding="utf-8"?>
+<file path=customXml/itemProps3.xml><?xml version="1.0" encoding="utf-8"?>
 <ds:datastoreItem xmlns:ds="http://schemas.openxmlformats.org/officeDocument/2006/customXml" ds:itemID="{53B502EA-CC61-4C3A-9239-E889C59E2245}">
   <ds:schemaRefs>
     <ds:schemaRef ds:uri="http://schemas.microsoft.com/office/2006/metadata/contentType"/>
@@ -38487,27 +37454,4 @@
     <ds:schemaRef ds:uri="http://schemas.microsoft.com/office/infopath/2007/PartnerControls"/>
   </ds:schemaRefs>
 </ds:datastoreItem>
-</file>
-
-<file path=customXml/itemProps2.xml><?xml version="1.0" encoding="utf-8"?>
-<ds:datastoreItem xmlns:ds="http://schemas.openxmlformats.org/officeDocument/2006/customXml" ds:itemID="{1C1284F2-D5A2-482D-9283-38905BD416F7}">
-  <ds:schemaRefs>
-    <ds:schemaRef ds:uri="http://schemas.microsoft.com/sharepoint/v3/contenttype/forms"/>
-  </ds:schemaRefs>
-</ds:datastoreItem>
-</file>
-
-<file path=customXml/itemProps3.xml><?xml version="1.0" encoding="utf-8"?>
-<ds:datastoreItem xmlns:ds="http://schemas.openxmlformats.org/officeDocument/2006/customXml" ds:itemID="{136497CF-FFDF-4FDB-8278-A4E189869E9B}">
-  <ds:schemaRefs>
-    <ds:schemaRef ds:uri="http://schemas.microsoft.com/office/2006/metadata/properties"/>
-    <ds:schemaRef ds:uri="http://purl.org/dc/terms/"/>
-    <ds:schemaRef ds:uri="http://schemas.openxmlformats.org/package/2006/metadata/core-properties"/>
-    <ds:schemaRef ds:uri="http://schemas.microsoft.com/office/2006/documentManagement/types"/>
-    <ds:schemaRef ds:uri="http://purl.org/dc/dcmitype/"/>
-    <ds:schemaRef ds:uri="http://schemas.microsoft.com/office/infopath/2007/PartnerControls"/>
-    <ds:schemaRef ds:uri="http://purl.org/dc/elements/1.1/"/>
-    <ds:schemaRef ds:uri="http://www.w3.org/XML/1998/namespace"/>
-  </ds:schemaRefs>
-</ds:datastoreItem>
 </file>
</xml_diff>